<commit_message>
atualizando os artefatos para a AC5 de engenharia de requisitos
</commit_message>
<xml_diff>
--- a/20 - Modelo Conceitual de Negócio .pptx
+++ b/20 - Modelo Conceitual de Negócio .pptx
@@ -104,19 +104,56 @@
       </a:defRPr>
     </a:lvl9pPr>
   </p:defaultTextStyle>
+  <p:extLst>
+    <p:ext uri="{EFAFB233-063F-42B5-8137-9DF3F51BA10A}">
+      <p15:sldGuideLst xmlns:p15="http://schemas.microsoft.com/office/powerpoint/2012/main"/>
+    </p:ext>
+  </p:extLst>
 </p:presentation>
 </file>
 
 <file path=ppt/revisionInfo.xml><?xml version="1.0" encoding="utf-8"?>
 <p1510:revInfo xmlns:a="http://schemas.openxmlformats.org/drawingml/2006/main" xmlns:r="http://schemas.openxmlformats.org/officeDocument/2006/relationships" xmlns:p1510="http://schemas.microsoft.com/office/powerpoint/2015/10/main">
   <p1510:revLst>
-    <p1510:client id="{958A62EB-6DD2-4310-AF3D-FD45F181F1A8}" v="1" dt="2020-10-22T02:39:48.203"/>
+    <p1510:client id="{8797AE47-8624-437E-AF43-EB6A5B1EB449}" v="1" dt="2020-11-09T21:22:19.035"/>
   </p1510:revLst>
 </p1510:revInfo>
 </file>
 
 <file path=ppt/changesInfos/changesInfo1.xml><?xml version="1.0" encoding="utf-8"?>
 <pc:chgInfo xmlns:a="http://schemas.openxmlformats.org/drawingml/2006/main" xmlns:r="http://schemas.openxmlformats.org/officeDocument/2006/relationships" xmlns:ac="http://schemas.microsoft.com/office/drawing/2013/main/command" xmlns:pc="http://schemas.microsoft.com/office/powerpoint/2013/main/command">
+  <pc:docChgLst>
+    <pc:chgData name="Rafael Izukawa" userId="8cd3af5bce398e7e" providerId="LiveId" clId="{8797AE47-8624-437E-AF43-EB6A5B1EB449}"/>
+    <pc:docChg chg="undo custSel modSld">
+      <pc:chgData name="Rafael Izukawa" userId="8cd3af5bce398e7e" providerId="LiveId" clId="{8797AE47-8624-437E-AF43-EB6A5B1EB449}" dt="2020-11-09T21:22:39.740" v="9" actId="14100"/>
+      <pc:docMkLst>
+        <pc:docMk/>
+      </pc:docMkLst>
+      <pc:sldChg chg="addSp delSp modSp mod">
+        <pc:chgData name="Rafael Izukawa" userId="8cd3af5bce398e7e" providerId="LiveId" clId="{8797AE47-8624-437E-AF43-EB6A5B1EB449}" dt="2020-11-09T21:22:39.740" v="9" actId="14100"/>
+        <pc:sldMkLst>
+          <pc:docMk/>
+          <pc:sldMk cId="1629118141" sldId="256"/>
+        </pc:sldMkLst>
+        <pc:picChg chg="add mod">
+          <ac:chgData name="Rafael Izukawa" userId="8cd3af5bce398e7e" providerId="LiveId" clId="{8797AE47-8624-437E-AF43-EB6A5B1EB449}" dt="2020-11-09T21:22:39.740" v="9" actId="14100"/>
+          <ac:picMkLst>
+            <pc:docMk/>
+            <pc:sldMk cId="1629118141" sldId="256"/>
+            <ac:picMk id="3" creationId="{3D761FE2-40BD-4E4C-BDE0-3F79D12FB695}"/>
+          </ac:picMkLst>
+        </pc:picChg>
+        <pc:picChg chg="del">
+          <ac:chgData name="Rafael Izukawa" userId="8cd3af5bce398e7e" providerId="LiveId" clId="{8797AE47-8624-437E-AF43-EB6A5B1EB449}" dt="2020-11-09T21:21:55.065" v="0" actId="478"/>
+          <ac:picMkLst>
+            <pc:docMk/>
+            <pc:sldMk cId="1629118141" sldId="256"/>
+            <ac:picMk id="5" creationId="{33D46153-D1E9-4511-83E6-AE88E6CC3CE4}"/>
+          </ac:picMkLst>
+        </pc:picChg>
+      </pc:sldChg>
+    </pc:docChg>
+  </pc:docChgLst>
   <pc:docChgLst>
     <pc:chgData name="Rafael Izukawa" userId="8cd3af5bce398e7e" providerId="LiveId" clId="{958A62EB-6DD2-4310-AF3D-FD45F181F1A8}"/>
     <pc:docChg chg="custSel addSld modSld">
@@ -307,7 +344,7 @@
           <a:p>
             <a:fld id="{A33591EC-CF49-470D-9D4B-36A6818E0D67}" type="datetimeFigureOut">
               <a:rPr lang="pt-BR" smtClean="0"/>
-              <a:t>21/10/2020</a:t>
+              <a:t>09/11/2020</a:t>
             </a:fld>
             <a:endParaRPr lang="pt-BR"/>
           </a:p>
@@ -505,7 +542,7 @@
           <a:p>
             <a:fld id="{A33591EC-CF49-470D-9D4B-36A6818E0D67}" type="datetimeFigureOut">
               <a:rPr lang="pt-BR" smtClean="0"/>
-              <a:t>21/10/2020</a:t>
+              <a:t>09/11/2020</a:t>
             </a:fld>
             <a:endParaRPr lang="pt-BR"/>
           </a:p>
@@ -713,7 +750,7 @@
           <a:p>
             <a:fld id="{A33591EC-CF49-470D-9D4B-36A6818E0D67}" type="datetimeFigureOut">
               <a:rPr lang="pt-BR" smtClean="0"/>
-              <a:t>21/10/2020</a:t>
+              <a:t>09/11/2020</a:t>
             </a:fld>
             <a:endParaRPr lang="pt-BR"/>
           </a:p>
@@ -911,7 +948,7 @@
           <a:p>
             <a:fld id="{A33591EC-CF49-470D-9D4B-36A6818E0D67}" type="datetimeFigureOut">
               <a:rPr lang="pt-BR" smtClean="0"/>
-              <a:t>21/10/2020</a:t>
+              <a:t>09/11/2020</a:t>
             </a:fld>
             <a:endParaRPr lang="pt-BR"/>
           </a:p>
@@ -1186,7 +1223,7 @@
           <a:p>
             <a:fld id="{A33591EC-CF49-470D-9D4B-36A6818E0D67}" type="datetimeFigureOut">
               <a:rPr lang="pt-BR" smtClean="0"/>
-              <a:t>21/10/2020</a:t>
+              <a:t>09/11/2020</a:t>
             </a:fld>
             <a:endParaRPr lang="pt-BR"/>
           </a:p>
@@ -1451,7 +1488,7 @@
           <a:p>
             <a:fld id="{A33591EC-CF49-470D-9D4B-36A6818E0D67}" type="datetimeFigureOut">
               <a:rPr lang="pt-BR" smtClean="0"/>
-              <a:t>21/10/2020</a:t>
+              <a:t>09/11/2020</a:t>
             </a:fld>
             <a:endParaRPr lang="pt-BR"/>
           </a:p>
@@ -1863,7 +1900,7 @@
           <a:p>
             <a:fld id="{A33591EC-CF49-470D-9D4B-36A6818E0D67}" type="datetimeFigureOut">
               <a:rPr lang="pt-BR" smtClean="0"/>
-              <a:t>21/10/2020</a:t>
+              <a:t>09/11/2020</a:t>
             </a:fld>
             <a:endParaRPr lang="pt-BR"/>
           </a:p>
@@ -2004,7 +2041,7 @@
           <a:p>
             <a:fld id="{A33591EC-CF49-470D-9D4B-36A6818E0D67}" type="datetimeFigureOut">
               <a:rPr lang="pt-BR" smtClean="0"/>
-              <a:t>21/10/2020</a:t>
+              <a:t>09/11/2020</a:t>
             </a:fld>
             <a:endParaRPr lang="pt-BR"/>
           </a:p>
@@ -2117,7 +2154,7 @@
           <a:p>
             <a:fld id="{A33591EC-CF49-470D-9D4B-36A6818E0D67}" type="datetimeFigureOut">
               <a:rPr lang="pt-BR" smtClean="0"/>
-              <a:t>21/10/2020</a:t>
+              <a:t>09/11/2020</a:t>
             </a:fld>
             <a:endParaRPr lang="pt-BR"/>
           </a:p>
@@ -2428,7 +2465,7 @@
           <a:p>
             <a:fld id="{A33591EC-CF49-470D-9D4B-36A6818E0D67}" type="datetimeFigureOut">
               <a:rPr lang="pt-BR" smtClean="0"/>
-              <a:t>21/10/2020</a:t>
+              <a:t>09/11/2020</a:t>
             </a:fld>
             <a:endParaRPr lang="pt-BR"/>
           </a:p>
@@ -2716,7 +2753,7 @@
           <a:p>
             <a:fld id="{A33591EC-CF49-470D-9D4B-36A6818E0D67}" type="datetimeFigureOut">
               <a:rPr lang="pt-BR" smtClean="0"/>
-              <a:t>21/10/2020</a:t>
+              <a:t>09/11/2020</a:t>
             </a:fld>
             <a:endParaRPr lang="pt-BR"/>
           </a:p>
@@ -2957,7 +2994,7 @@
           <a:p>
             <a:fld id="{A33591EC-CF49-470D-9D4B-36A6818E0D67}" type="datetimeFigureOut">
               <a:rPr lang="pt-BR" smtClean="0"/>
-              <a:t>21/10/2020</a:t>
+              <a:t>09/11/2020</a:t>
             </a:fld>
             <a:endParaRPr lang="pt-BR"/>
           </a:p>
@@ -3376,10 +3413,10 @@
       </p:grpSpPr>
       <p:pic>
         <p:nvPicPr>
-          <p:cNvPr id="5" name="Imagem 4" descr="Imagem em preto e branco&#10;&#10;Descrição gerada automaticamente">
-            <a:extLst>
-              <a:ext uri="{FF2B5EF4-FFF2-40B4-BE49-F238E27FC236}">
-                <a16:creationId xmlns:a16="http://schemas.microsoft.com/office/drawing/2014/main" id="{33D46153-D1E9-4511-83E6-AE88E6CC3CE4}"/>
+          <p:cNvPr id="3" name="Imagem 2" descr="Imagem em preto e branco&#10;&#10;Descrição gerada automaticamente">
+            <a:extLst>
+              <a:ext uri="{FF2B5EF4-FFF2-40B4-BE49-F238E27FC236}">
+                <a16:creationId xmlns:a16="http://schemas.microsoft.com/office/drawing/2014/main" id="{3D761FE2-40BD-4E4C-BDE0-3F79D12FB695}"/>
               </a:ext>
             </a:extLst>
           </p:cNvPr>
@@ -3402,8 +3439,8 @@
         </p:blipFill>
         <p:spPr>
           <a:xfrm>
-            <a:off x="2151336" y="0"/>
-            <a:ext cx="7889328" cy="6858000"/>
+            <a:off x="2183363" y="0"/>
+            <a:ext cx="7632441" cy="6858000"/>
           </a:xfrm>
           <a:prstGeom prst="rect">
             <a:avLst/>

</xml_diff>